<commit_message>
Collection des icons web
</commit_message>
<xml_diff>
--- a/oral_projet/revue_1/diaporama_revue_1_dylan.pptx
+++ b/oral_projet/revue_1/diaporama_revue_1_dylan.pptx
@@ -204,7 +204,7 @@
           <a:p>
             <a:fld id="{7BEC4371-174F-4615-858D-8B61BA547698}" type="datetimeFigureOut">
               <a:rPr lang="fr-FR" smtClean="0"/>
-              <a:t>29/01/2018</a:t>
+              <a:t>12/02/2018</a:t>
             </a:fld>
             <a:endParaRPr lang="fr-FR"/>
           </a:p>
@@ -618,7 +618,7 @@
           <a:p>
             <a:fld id="{125942D7-A464-4365-815E-3C7EAFC3F152}" type="datetimeFigureOut">
               <a:rPr lang="fr-FR" smtClean="0"/>
-              <a:t>29/01/2018</a:t>
+              <a:t>12/02/2018</a:t>
             </a:fld>
             <a:endParaRPr lang="fr-FR"/>
           </a:p>
@@ -828,7 +828,7 @@
           <a:p>
             <a:fld id="{125942D7-A464-4365-815E-3C7EAFC3F152}" type="datetimeFigureOut">
               <a:rPr lang="fr-FR" smtClean="0"/>
-              <a:t>29/01/2018</a:t>
+              <a:t>12/02/2018</a:t>
             </a:fld>
             <a:endParaRPr lang="fr-FR"/>
           </a:p>
@@ -1048,7 +1048,7 @@
           <a:p>
             <a:fld id="{125942D7-A464-4365-815E-3C7EAFC3F152}" type="datetimeFigureOut">
               <a:rPr lang="fr-FR" smtClean="0"/>
-              <a:t>29/01/2018</a:t>
+              <a:t>12/02/2018</a:t>
             </a:fld>
             <a:endParaRPr lang="fr-FR"/>
           </a:p>
@@ -1258,7 +1258,7 @@
           <a:p>
             <a:fld id="{125942D7-A464-4365-815E-3C7EAFC3F152}" type="datetimeFigureOut">
               <a:rPr lang="fr-FR" smtClean="0"/>
-              <a:t>29/01/2018</a:t>
+              <a:t>12/02/2018</a:t>
             </a:fld>
             <a:endParaRPr lang="fr-FR"/>
           </a:p>
@@ -1545,7 +1545,7 @@
           <a:p>
             <a:fld id="{125942D7-A464-4365-815E-3C7EAFC3F152}" type="datetimeFigureOut">
               <a:rPr lang="fr-FR" smtClean="0"/>
-              <a:t>29/01/2018</a:t>
+              <a:t>12/02/2018</a:t>
             </a:fld>
             <a:endParaRPr lang="fr-FR"/>
           </a:p>
@@ -1822,7 +1822,7 @@
           <a:p>
             <a:fld id="{125942D7-A464-4365-815E-3C7EAFC3F152}" type="datetimeFigureOut">
               <a:rPr lang="fr-FR" smtClean="0"/>
-              <a:t>29/01/2018</a:t>
+              <a:t>12/02/2018</a:t>
             </a:fld>
             <a:endParaRPr lang="fr-FR"/>
           </a:p>
@@ -2246,7 +2246,7 @@
           <a:p>
             <a:fld id="{125942D7-A464-4365-815E-3C7EAFC3F152}" type="datetimeFigureOut">
               <a:rPr lang="fr-FR" smtClean="0"/>
-              <a:t>29/01/2018</a:t>
+              <a:t>12/02/2018</a:t>
             </a:fld>
             <a:endParaRPr lang="fr-FR"/>
           </a:p>
@@ -2399,7 +2399,7 @@
           <a:p>
             <a:fld id="{125942D7-A464-4365-815E-3C7EAFC3F152}" type="datetimeFigureOut">
               <a:rPr lang="fr-FR" smtClean="0"/>
-              <a:t>29/01/2018</a:t>
+              <a:t>12/02/2018</a:t>
             </a:fld>
             <a:endParaRPr lang="fr-FR"/>
           </a:p>
@@ -2524,7 +2524,7 @@
           <a:p>
             <a:fld id="{125942D7-A464-4365-815E-3C7EAFC3F152}" type="datetimeFigureOut">
               <a:rPr lang="fr-FR" smtClean="0"/>
-              <a:t>29/01/2018</a:t>
+              <a:t>12/02/2018</a:t>
             </a:fld>
             <a:endParaRPr lang="fr-FR"/>
           </a:p>
@@ -2847,7 +2847,7 @@
           <a:p>
             <a:fld id="{125942D7-A464-4365-815E-3C7EAFC3F152}" type="datetimeFigureOut">
               <a:rPr lang="fr-FR" smtClean="0"/>
-              <a:t>29/01/2018</a:t>
+              <a:t>12/02/2018</a:t>
             </a:fld>
             <a:endParaRPr lang="fr-FR"/>
           </a:p>
@@ -3147,7 +3147,7 @@
           <a:p>
             <a:fld id="{125942D7-A464-4365-815E-3C7EAFC3F152}" type="datetimeFigureOut">
               <a:rPr lang="fr-FR" smtClean="0"/>
-              <a:t>29/01/2018</a:t>
+              <a:t>12/02/2018</a:t>
             </a:fld>
             <a:endParaRPr lang="fr-FR"/>
           </a:p>
@@ -3400,7 +3400,7 @@
           <a:p>
             <a:fld id="{125942D7-A464-4365-815E-3C7EAFC3F152}" type="datetimeFigureOut">
               <a:rPr lang="fr-FR" smtClean="0"/>
-              <a:t>29/01/2018</a:t>
+              <a:t>12/02/2018</a:t>
             </a:fld>
             <a:endParaRPr lang="fr-FR"/>
           </a:p>

</xml_diff>